<commit_message>
reupload to fix sccharts glitch
</commit_message>
<xml_diff>
--- a/Assignment 2.pptx
+++ b/Assignment 2.pptx
@@ -5,21 +5,20 @@
     <p:sldMasterId id="2147483648" r:id="rId1"/>
   </p:sldMasterIdLst>
   <p:notesMasterIdLst>
-    <p:notesMasterId r:id="rId11"/>
+    <p:notesMasterId r:id="rId10"/>
   </p:notesMasterIdLst>
   <p:handoutMasterIdLst>
-    <p:handoutMasterId r:id="rId12"/>
+    <p:handoutMasterId r:id="rId11"/>
   </p:handoutMasterIdLst>
   <p:sldIdLst>
     <p:sldId id="256" r:id="rId2"/>
-    <p:sldId id="257" r:id="rId3"/>
-    <p:sldId id="267" r:id="rId4"/>
-    <p:sldId id="268" r:id="rId5"/>
-    <p:sldId id="269" r:id="rId6"/>
-    <p:sldId id="270" r:id="rId7"/>
-    <p:sldId id="271" r:id="rId8"/>
-    <p:sldId id="272" r:id="rId9"/>
-    <p:sldId id="273" r:id="rId10"/>
+    <p:sldId id="273" r:id="rId3"/>
+    <p:sldId id="272" r:id="rId4"/>
+    <p:sldId id="271" r:id="rId5"/>
+    <p:sldId id="270" r:id="rId6"/>
+    <p:sldId id="268" r:id="rId7"/>
+    <p:sldId id="269" r:id="rId8"/>
+    <p:sldId id="274" r:id="rId9"/>
   </p:sldIdLst>
   <p:sldSz cx="12192000" cy="6858000"/>
   <p:notesSz cx="6858000" cy="9144000"/>
@@ -222,7 +221,7 @@
           <a:p>
             <a:fld id="{043B725B-653D-4166-A8E9-72A38A1847CF}" type="datetimeFigureOut">
               <a:rPr lang="en-US"/>
-              <a:t>9/24/2019</a:t>
+              <a:t>9/25/2019</a:t>
             </a:fld>
             <a:endParaRPr/>
           </a:p>
@@ -387,7 +386,7 @@
           <a:p>
             <a:fld id="{783F64CD-0576-4A9A-BD06-7889D6E60BDC}" type="datetimeFigureOut">
               <a:rPr lang="en-US"/>
-              <a:t>9/24/2019</a:t>
+              <a:t>9/25/2019</a:t>
             </a:fld>
             <a:endParaRPr/>
           </a:p>
@@ -985,7 +984,7 @@
           <a:p>
             <a:fld id="{37CC0096-1860-4642-9CD2-0079EA5E7CD1}" type="datetimeFigureOut">
               <a:rPr lang="en-US"/>
-              <a:t>9/24/2019</a:t>
+              <a:t>9/25/2019</a:t>
             </a:fld>
             <a:endParaRPr/>
           </a:p>
@@ -1234,7 +1233,7 @@
           <a:p>
             <a:fld id="{37CC0096-1860-4642-9CD2-0079EA5E7CD1}" type="datetimeFigureOut">
               <a:rPr lang="en-US"/>
-              <a:t>9/24/2019</a:t>
+              <a:t>9/25/2019</a:t>
             </a:fld>
             <a:endParaRPr/>
           </a:p>
@@ -1420,7 +1419,7 @@
           <a:p>
             <a:fld id="{37CC0096-1860-4642-9CD2-0079EA5E7CD1}" type="datetimeFigureOut">
               <a:rPr lang="en-US"/>
-              <a:t>9/24/2019</a:t>
+              <a:t>9/25/2019</a:t>
             </a:fld>
             <a:endParaRPr/>
           </a:p>
@@ -1951,7 +1950,7 @@
           <a:p>
             <a:fld id="{37CC0096-1860-4642-9CD2-0079EA5E7CD1}" type="datetimeFigureOut">
               <a:rPr lang="en-US"/>
-              <a:t>9/24/2019</a:t>
+              <a:t>9/25/2019</a:t>
             </a:fld>
             <a:endParaRPr/>
           </a:p>
@@ -2403,7 +2402,7 @@
           <a:p>
             <a:fld id="{37CC0096-1860-4642-9CD2-0079EA5E7CD1}" type="datetimeFigureOut">
               <a:rPr lang="en-US"/>
-              <a:t>9/24/2019</a:t>
+              <a:t>9/25/2019</a:t>
             </a:fld>
             <a:endParaRPr/>
           </a:p>
@@ -2533,7 +2532,7 @@
           <a:p>
             <a:fld id="{37CC0096-1860-4642-9CD2-0079EA5E7CD1}" type="datetimeFigureOut">
               <a:rPr lang="en-US"/>
-              <a:t>9/24/2019</a:t>
+              <a:t>9/25/2019</a:t>
             </a:fld>
             <a:endParaRPr/>
           </a:p>
@@ -2640,7 +2639,7 @@
           <a:p>
             <a:fld id="{37CC0096-1860-4642-9CD2-0079EA5E7CD1}" type="datetimeFigureOut">
               <a:rPr lang="en-US"/>
-              <a:t>9/24/2019</a:t>
+              <a:t>9/25/2019</a:t>
             </a:fld>
             <a:endParaRPr/>
           </a:p>
@@ -3629,7 +3628,7 @@
             <a:fld id="{37CC0096-1860-4642-9CD2-0079EA5E7CD1}" type="datetimeFigureOut">
               <a:rPr lang="en-US" smtClean="0"/>
               <a:pPr/>
-              <a:t>9/24/2019</a:t>
+              <a:t>9/25/2019</a:t>
             </a:fld>
             <a:endParaRPr lang="en-US" dirty="0"/>
           </a:p>
@@ -4150,6 +4149,13 @@
       </p:transition>
     </mc:Fallback>
   </mc:AlternateContent>
+  <p:timing>
+    <p:tnLst>
+      <p:par>
+        <p:cTn id="1" dur="indefinite" restart="never" nodeType="tmRoot"/>
+      </p:par>
+    </p:tnLst>
+  </p:timing>
 </p:sld>
 </file>
 
@@ -4172,39 +4178,71 @@
       </p:grpSpPr>
       <p:sp>
         <p:nvSpPr>
-          <p:cNvPr id="2" name="Title 1"/>
-          <p:cNvSpPr>
-            <a:spLocks noGrp="1"/>
-          </p:cNvSpPr>
-          <p:nvPr>
-            <p:ph type="title"/>
-          </p:nvPr>
-        </p:nvSpPr>
-        <p:spPr/>
-        <p:txBody>
-          <a:bodyPr/>
-          <a:lstStyle/>
-          <a:p>
-            <a:r>
-              <a:rPr lang="en-US" dirty="0" err="1"/>
-              <a:t>SCCharts</a:t>
-            </a:r>
-            <a:r>
-              <a:rPr lang="en-US" dirty="0"/>
-              <a:t> Overview (1)</a:t>
-            </a:r>
-          </a:p>
-        </p:txBody>
-      </p:sp>
-      <p:pic>
-        <p:nvPicPr>
-          <p:cNvPr id="4" name="Picture 3">
+          <p:cNvPr id="2" name="Title 1">
             <a:extLst>
               <a:ext uri="{FF2B5EF4-FFF2-40B4-BE49-F238E27FC236}">
-                <a16:creationId xmlns:a16="http://schemas.microsoft.com/office/drawing/2014/main" id="{18B692F4-8BB4-423E-9761-EEE714DA94C6}"/>
+                <a16:creationId xmlns:a16="http://schemas.microsoft.com/office/drawing/2014/main" id="{ACA4E274-B443-40FC-B519-4F087C987E15}"/>
               </a:ext>
             </a:extLst>
           </p:cNvPr>
+          <p:cNvSpPr>
+            <a:spLocks noGrp="1"/>
+          </p:cNvSpPr>
+          <p:nvPr>
+            <p:ph type="title"/>
+          </p:nvPr>
+        </p:nvSpPr>
+        <p:spPr/>
+        <p:txBody>
+          <a:bodyPr/>
+          <a:lstStyle/>
+          <a:p>
+            <a:r>
+              <a:rPr lang="en-NZ" dirty="0"/>
+              <a:t>AVI and </a:t>
+            </a:r>
+            <a:r>
+              <a:rPr lang="en-NZ" dirty="0" err="1"/>
+              <a:t>AVITimer</a:t>
+            </a:r>
+            <a:r>
+              <a:rPr lang="en-NZ" dirty="0"/>
+              <a:t> (Atrioventricular Interval)</a:t>
+            </a:r>
+          </a:p>
+        </p:txBody>
+      </p:sp>
+      <p:sp>
+        <p:nvSpPr>
+          <p:cNvPr id="3" name="Content Placeholder 2">
+            <a:extLst>
+              <a:ext uri="{FF2B5EF4-FFF2-40B4-BE49-F238E27FC236}">
+                <a16:creationId xmlns:a16="http://schemas.microsoft.com/office/drawing/2014/main" id="{43BB4A1C-D7F5-4AD6-93E7-8ED4FE1B4288}"/>
+              </a:ext>
+            </a:extLst>
+          </p:cNvPr>
+          <p:cNvSpPr>
+            <a:spLocks noGrp="1"/>
+          </p:cNvSpPr>
+          <p:nvPr>
+            <p:ph idx="1"/>
+          </p:nvPr>
+        </p:nvSpPr>
+        <p:spPr/>
+        <p:txBody>
+          <a:bodyPr/>
+          <a:lstStyle/>
+          <a:p>
+            <a:r>
+              <a:rPr lang="en-NZ" dirty="0"/>
+              <a:t>Maximum time between Atrial Event and its subsequent Ventricular Event</a:t>
+            </a:r>
+          </a:p>
+        </p:txBody>
+      </p:sp>
+      <p:pic>
+        <p:nvPicPr>
+          <p:cNvPr id="5" name="Picture 4"/>
           <p:cNvPicPr>
             <a:picLocks noChangeAspect="1"/>
           </p:cNvPicPr>
@@ -4218,8 +4256,32 @@
         </p:blipFill>
         <p:spPr>
           <a:xfrm>
-            <a:off x="2531604" y="1553572"/>
-            <a:ext cx="7128792" cy="5285583"/>
+            <a:off x="1415480" y="2998674"/>
+            <a:ext cx="5053910" cy="2232248"/>
+          </a:xfrm>
+          <a:prstGeom prst="rect">
+            <a:avLst/>
+          </a:prstGeom>
+        </p:spPr>
+      </p:pic>
+      <p:pic>
+        <p:nvPicPr>
+          <p:cNvPr id="7" name="Picture 6"/>
+          <p:cNvPicPr>
+            <a:picLocks noChangeAspect="1"/>
+          </p:cNvPicPr>
+          <p:nvPr/>
+        </p:nvPicPr>
+        <p:blipFill>
+          <a:blip r:embed="rId3"/>
+          <a:stretch>
+            <a:fillRect/>
+          </a:stretch>
+        </p:blipFill>
+        <p:spPr>
+          <a:xfrm>
+            <a:off x="7608168" y="2636912"/>
+            <a:ext cx="4104456" cy="2912840"/>
           </a:xfrm>
           <a:prstGeom prst="rect">
             <a:avLst/>
@@ -4229,7 +4291,7 @@
     </p:spTree>
     <p:extLst>
       <p:ext uri="{BB962C8B-B14F-4D97-AF65-F5344CB8AC3E}">
-        <p14:creationId xmlns:p14="http://schemas.microsoft.com/office/powerpoint/2010/main" val="1772969468"/>
+        <p14:creationId xmlns:p14="http://schemas.microsoft.com/office/powerpoint/2010/main" val="3904751218"/>
       </p:ext>
     </p:extLst>
   </p:cSld>
@@ -4248,6 +4310,13 @@
       </p:transition>
     </mc:Fallback>
   </mc:AlternateContent>
+  <p:timing>
+    <p:tnLst>
+      <p:par>
+        <p:cTn id="1" dur="indefinite" restart="never" nodeType="tmRoot"/>
+      </p:par>
+    </p:tnLst>
+  </p:timing>
 </p:sld>
 </file>
 
@@ -4273,7 +4342,7 @@
           <p:cNvPr id="2" name="Title 1">
             <a:extLst>
               <a:ext uri="{FF2B5EF4-FFF2-40B4-BE49-F238E27FC236}">
-                <a16:creationId xmlns:a16="http://schemas.microsoft.com/office/drawing/2014/main" id="{EA997138-57C6-4052-A87B-331BB020707B}"/>
+                <a16:creationId xmlns:a16="http://schemas.microsoft.com/office/drawing/2014/main" id="{F36FB3B9-A40A-4385-A110-4F142D91ED71}"/>
               </a:ext>
             </a:extLst>
           </p:cNvPr>
@@ -4290,12 +4359,36 @@
           <a:lstStyle/>
           <a:p>
             <a:r>
-              <a:rPr lang="en-NZ" dirty="0" err="1"/>
-              <a:t>SCCharts</a:t>
-            </a:r>
-            <a:r>
               <a:rPr lang="en-NZ" dirty="0"/>
-              <a:t> Overview (2)</a:t>
+              <a:t>PVARP (Post-Ventricular Atrial Refractory Period)</a:t>
+            </a:r>
+          </a:p>
+        </p:txBody>
+      </p:sp>
+      <p:sp>
+        <p:nvSpPr>
+          <p:cNvPr id="3" name="Content Placeholder 2">
+            <a:extLst>
+              <a:ext uri="{FF2B5EF4-FFF2-40B4-BE49-F238E27FC236}">
+                <a16:creationId xmlns:a16="http://schemas.microsoft.com/office/drawing/2014/main" id="{623E30F5-38C8-45D9-BB12-BB953F9B9CFB}"/>
+              </a:ext>
+            </a:extLst>
+          </p:cNvPr>
+          <p:cNvSpPr>
+            <a:spLocks noGrp="1"/>
+          </p:cNvSpPr>
+          <p:nvPr>
+            <p:ph idx="1"/>
+          </p:nvPr>
+        </p:nvSpPr>
+        <p:spPr/>
+        <p:txBody>
+          <a:bodyPr/>
+          <a:lstStyle/>
+          <a:p>
+            <a:r>
+              <a:rPr lang="en-NZ" dirty="0"/>
+              <a:t>Time after a Ventricular Event where any Atrial Events are ignored as Atrial Refractory (AR) signal</a:t>
             </a:r>
           </a:p>
         </p:txBody>
@@ -4305,7 +4398,7 @@
           <p:cNvPr id="4" name="Picture 3">
             <a:extLst>
               <a:ext uri="{FF2B5EF4-FFF2-40B4-BE49-F238E27FC236}">
-                <a16:creationId xmlns:a16="http://schemas.microsoft.com/office/drawing/2014/main" id="{197EF79A-2F2F-40F4-AC1C-75DB514AD42A}"/>
+                <a16:creationId xmlns:a16="http://schemas.microsoft.com/office/drawing/2014/main" id="{E3AFA16F-096B-43BB-BAF9-2600E980F4AC}"/>
               </a:ext>
             </a:extLst>
           </p:cNvPr>
@@ -4322,8 +4415,8 @@
         </p:blipFill>
         <p:spPr>
           <a:xfrm>
-            <a:off x="908161" y="2924944"/>
-            <a:ext cx="10375678" cy="2808312"/>
+            <a:off x="3923940" y="3068960"/>
+            <a:ext cx="4344119" cy="2885026"/>
           </a:xfrm>
           <a:prstGeom prst="rect">
             <a:avLst/>
@@ -4333,7 +4426,7 @@
     </p:spTree>
     <p:extLst>
       <p:ext uri="{BB962C8B-B14F-4D97-AF65-F5344CB8AC3E}">
-        <p14:creationId xmlns:p14="http://schemas.microsoft.com/office/powerpoint/2010/main" val="2263616719"/>
+        <p14:creationId xmlns:p14="http://schemas.microsoft.com/office/powerpoint/2010/main" val="1636709026"/>
       </p:ext>
     </p:extLst>
   </p:cSld>
@@ -4352,6 +4445,13 @@
       </p:transition>
     </mc:Fallback>
   </mc:AlternateContent>
+  <p:timing>
+    <p:tnLst>
+      <p:par>
+        <p:cTn id="1" dur="indefinite" restart="never" nodeType="tmRoot"/>
+      </p:par>
+    </p:tnLst>
+  </p:timing>
 </p:sld>
 </file>
 
@@ -4377,6 +4477,308 @@
           <p:cNvPr id="2" name="Title 1">
             <a:extLst>
               <a:ext uri="{FF2B5EF4-FFF2-40B4-BE49-F238E27FC236}">
+                <a16:creationId xmlns:a16="http://schemas.microsoft.com/office/drawing/2014/main" id="{AF4F58B3-00C1-42BE-AA39-AF54C3AE9FB3}"/>
+              </a:ext>
+            </a:extLst>
+          </p:cNvPr>
+          <p:cNvSpPr>
+            <a:spLocks noGrp="1"/>
+          </p:cNvSpPr>
+          <p:nvPr>
+            <p:ph type="title"/>
+          </p:nvPr>
+        </p:nvSpPr>
+        <p:spPr/>
+        <p:txBody>
+          <a:bodyPr/>
+          <a:lstStyle/>
+          <a:p>
+            <a:r>
+              <a:rPr lang="en-NZ" dirty="0"/>
+              <a:t>VRP (Ventricular Refractory Period)</a:t>
+            </a:r>
+          </a:p>
+        </p:txBody>
+      </p:sp>
+      <p:sp>
+        <p:nvSpPr>
+          <p:cNvPr id="3" name="Content Placeholder 2">
+            <a:extLst>
+              <a:ext uri="{FF2B5EF4-FFF2-40B4-BE49-F238E27FC236}">
+                <a16:creationId xmlns:a16="http://schemas.microsoft.com/office/drawing/2014/main" id="{8CEFB5CE-4A52-420B-A692-9217F4405754}"/>
+              </a:ext>
+            </a:extLst>
+          </p:cNvPr>
+          <p:cNvSpPr>
+            <a:spLocks noGrp="1"/>
+          </p:cNvSpPr>
+          <p:nvPr>
+            <p:ph idx="1"/>
+          </p:nvPr>
+        </p:nvSpPr>
+        <p:spPr/>
+        <p:txBody>
+          <a:bodyPr/>
+          <a:lstStyle/>
+          <a:p>
+            <a:r>
+              <a:rPr lang="en-NZ" dirty="0"/>
+              <a:t>Time after a Atrial Event where any Ventricular Events are ignored as Ventricular Refractory (VR) signal</a:t>
+            </a:r>
+          </a:p>
+        </p:txBody>
+      </p:sp>
+      <p:pic>
+        <p:nvPicPr>
+          <p:cNvPr id="4" name="Picture 3">
+            <a:extLst>
+              <a:ext uri="{FF2B5EF4-FFF2-40B4-BE49-F238E27FC236}">
+                <a16:creationId xmlns:a16="http://schemas.microsoft.com/office/drawing/2014/main" id="{71005514-2F92-4547-941A-176121E3C9BA}"/>
+              </a:ext>
+            </a:extLst>
+          </p:cNvPr>
+          <p:cNvPicPr>
+            <a:picLocks noChangeAspect="1"/>
+          </p:cNvPicPr>
+          <p:nvPr/>
+        </p:nvPicPr>
+        <p:blipFill>
+          <a:blip r:embed="rId2"/>
+          <a:stretch>
+            <a:fillRect/>
+          </a:stretch>
+        </p:blipFill>
+        <p:spPr>
+          <a:xfrm>
+            <a:off x="3776725" y="2924944"/>
+            <a:ext cx="4638549" cy="3172768"/>
+          </a:xfrm>
+          <a:prstGeom prst="rect">
+            <a:avLst/>
+          </a:prstGeom>
+        </p:spPr>
+      </p:pic>
+    </p:spTree>
+    <p:extLst>
+      <p:ext uri="{BB962C8B-B14F-4D97-AF65-F5344CB8AC3E}">
+        <p14:creationId xmlns:p14="http://schemas.microsoft.com/office/powerpoint/2010/main" val="2722226679"/>
+      </p:ext>
+    </p:extLst>
+  </p:cSld>
+  <p:clrMapOvr>
+    <a:masterClrMapping/>
+  </p:clrMapOvr>
+  <mc:AlternateContent xmlns:mc="http://schemas.openxmlformats.org/markup-compatibility/2006" xmlns:p14="http://schemas.microsoft.com/office/powerpoint/2010/main">
+    <mc:Choice Requires="p14">
+      <p:transition spd="med" p14:dur="700">
+        <p:fade/>
+      </p:transition>
+    </mc:Choice>
+    <mc:Fallback xmlns="">
+      <p:transition spd="med">
+        <p:fade/>
+      </p:transition>
+    </mc:Fallback>
+  </mc:AlternateContent>
+  <p:timing>
+    <p:tnLst>
+      <p:par>
+        <p:cTn id="1" dur="indefinite" restart="never" nodeType="tmRoot"/>
+      </p:par>
+    </p:tnLst>
+  </p:timing>
+</p:sld>
+</file>
+
+<file path=ppt/slides/slide5.xml><?xml version="1.0" encoding="utf-8"?>
+<p:sld xmlns:a="http://schemas.openxmlformats.org/drawingml/2006/main" xmlns:r="http://schemas.openxmlformats.org/officeDocument/2006/relationships" xmlns:p="http://schemas.openxmlformats.org/presentationml/2006/main">
+  <p:cSld>
+    <p:spTree>
+      <p:nvGrpSpPr>
+        <p:cNvPr id="1" name=""/>
+        <p:cNvGrpSpPr/>
+        <p:nvPr/>
+      </p:nvGrpSpPr>
+      <p:grpSpPr>
+        <a:xfrm>
+          <a:off x="0" y="0"/>
+          <a:ext cx="0" cy="0"/>
+          <a:chOff x="0" y="0"/>
+          <a:chExt cx="0" cy="0"/>
+        </a:xfrm>
+      </p:grpSpPr>
+      <p:sp>
+        <p:nvSpPr>
+          <p:cNvPr id="2" name="Title 1">
+            <a:extLst>
+              <a:ext uri="{FF2B5EF4-FFF2-40B4-BE49-F238E27FC236}">
+                <a16:creationId xmlns:a16="http://schemas.microsoft.com/office/drawing/2014/main" id="{9C41E3E7-B5D2-4F20-B083-39774B938E67}"/>
+              </a:ext>
+            </a:extLst>
+          </p:cNvPr>
+          <p:cNvSpPr>
+            <a:spLocks noGrp="1"/>
+          </p:cNvSpPr>
+          <p:nvPr>
+            <p:ph type="title"/>
+          </p:nvPr>
+        </p:nvSpPr>
+        <p:spPr/>
+        <p:txBody>
+          <a:bodyPr/>
+          <a:lstStyle/>
+          <a:p>
+            <a:r>
+              <a:rPr lang="en-NZ" dirty="0"/>
+              <a:t>AEI and </a:t>
+            </a:r>
+            <a:r>
+              <a:rPr lang="en-NZ" dirty="0" err="1"/>
+              <a:t>AEITimer</a:t>
+            </a:r>
+            <a:r>
+              <a:rPr lang="en-NZ" dirty="0"/>
+              <a:t> (Atrial Escape Interval)</a:t>
+            </a:r>
+          </a:p>
+        </p:txBody>
+      </p:sp>
+      <p:sp>
+        <p:nvSpPr>
+          <p:cNvPr id="3" name="Content Placeholder 2">
+            <a:extLst>
+              <a:ext uri="{FF2B5EF4-FFF2-40B4-BE49-F238E27FC236}">
+                <a16:creationId xmlns:a16="http://schemas.microsoft.com/office/drawing/2014/main" id="{ACE32FF2-A151-4796-A878-B37096FEA82A}"/>
+              </a:ext>
+            </a:extLst>
+          </p:cNvPr>
+          <p:cNvSpPr>
+            <a:spLocks noGrp="1"/>
+          </p:cNvSpPr>
+          <p:nvPr>
+            <p:ph idx="1"/>
+          </p:nvPr>
+        </p:nvSpPr>
+        <p:spPr/>
+        <p:txBody>
+          <a:bodyPr/>
+          <a:lstStyle/>
+          <a:p>
+            <a:r>
+              <a:rPr lang="en-NZ" dirty="0"/>
+              <a:t>Maximum time between a Ventricular Event and its subsequent Atrial Event</a:t>
+            </a:r>
+          </a:p>
+        </p:txBody>
+      </p:sp>
+      <p:pic>
+        <p:nvPicPr>
+          <p:cNvPr id="5" name="Picture 4">
+            <a:extLst>
+              <a:ext uri="{FF2B5EF4-FFF2-40B4-BE49-F238E27FC236}">
+                <a16:creationId xmlns:a16="http://schemas.microsoft.com/office/drawing/2014/main" id="{2F260AFF-13E4-4826-8ACD-29157B6F22CE}"/>
+              </a:ext>
+            </a:extLst>
+          </p:cNvPr>
+          <p:cNvPicPr>
+            <a:picLocks noChangeAspect="1"/>
+          </p:cNvPicPr>
+          <p:nvPr/>
+        </p:nvPicPr>
+        <p:blipFill>
+          <a:blip r:embed="rId2"/>
+          <a:stretch>
+            <a:fillRect/>
+          </a:stretch>
+        </p:blipFill>
+        <p:spPr>
+          <a:xfrm>
+            <a:off x="1929543" y="3111077"/>
+            <a:ext cx="3888432" cy="2007442"/>
+          </a:xfrm>
+          <a:prstGeom prst="rect">
+            <a:avLst/>
+          </a:prstGeom>
+        </p:spPr>
+      </p:pic>
+      <p:pic>
+        <p:nvPicPr>
+          <p:cNvPr id="4" name="Picture 3"/>
+          <p:cNvPicPr>
+            <a:picLocks noChangeAspect="1"/>
+          </p:cNvPicPr>
+          <p:nvPr/>
+        </p:nvPicPr>
+        <p:blipFill>
+          <a:blip r:embed="rId3"/>
+          <a:stretch>
+            <a:fillRect/>
+          </a:stretch>
+        </p:blipFill>
+        <p:spPr>
+          <a:xfrm>
+            <a:off x="7740589" y="2376384"/>
+            <a:ext cx="3321359" cy="3476827"/>
+          </a:xfrm>
+          <a:prstGeom prst="rect">
+            <a:avLst/>
+          </a:prstGeom>
+        </p:spPr>
+      </p:pic>
+    </p:spTree>
+    <p:extLst>
+      <p:ext uri="{BB962C8B-B14F-4D97-AF65-F5344CB8AC3E}">
+        <p14:creationId xmlns:p14="http://schemas.microsoft.com/office/powerpoint/2010/main" val="3732500485"/>
+      </p:ext>
+    </p:extLst>
+  </p:cSld>
+  <p:clrMapOvr>
+    <a:masterClrMapping/>
+  </p:clrMapOvr>
+  <mc:AlternateContent xmlns:mc="http://schemas.openxmlformats.org/markup-compatibility/2006" xmlns:p14="http://schemas.microsoft.com/office/powerpoint/2010/main">
+    <mc:Choice Requires="p14">
+      <p:transition spd="med" p14:dur="700">
+        <p:fade/>
+      </p:transition>
+    </mc:Choice>
+    <mc:Fallback xmlns="">
+      <p:transition spd="med">
+        <p:fade/>
+      </p:transition>
+    </mc:Fallback>
+  </mc:AlternateContent>
+  <p:timing>
+    <p:tnLst>
+      <p:par>
+        <p:cTn id="1" dur="indefinite" restart="never" nodeType="tmRoot"/>
+      </p:par>
+    </p:tnLst>
+  </p:timing>
+</p:sld>
+</file>
+
+<file path=ppt/slides/slide6.xml><?xml version="1.0" encoding="utf-8"?>
+<p:sld xmlns:a="http://schemas.openxmlformats.org/drawingml/2006/main" xmlns:r="http://schemas.openxmlformats.org/officeDocument/2006/relationships" xmlns:p="http://schemas.openxmlformats.org/presentationml/2006/main">
+  <p:cSld>
+    <p:spTree>
+      <p:nvGrpSpPr>
+        <p:cNvPr id="1" name=""/>
+        <p:cNvGrpSpPr/>
+        <p:nvPr/>
+      </p:nvGrpSpPr>
+      <p:grpSpPr>
+        <a:xfrm>
+          <a:off x="0" y="0"/>
+          <a:ext cx="0" cy="0"/>
+          <a:chOff x="0" y="0"/>
+          <a:chExt cx="0" cy="0"/>
+        </a:xfrm>
+      </p:grpSpPr>
+      <p:sp>
+        <p:nvSpPr>
+          <p:cNvPr id="2" name="Title 1">
+            <a:extLst>
+              <a:ext uri="{FF2B5EF4-FFF2-40B4-BE49-F238E27FC236}">
                 <a16:creationId xmlns:a16="http://schemas.microsoft.com/office/drawing/2014/main" id="{A61C3F5D-FFE9-49BF-8165-55CE6685E0CA}"/>
               </a:ext>
             </a:extLst>
@@ -4401,7 +4803,10 @@
               <a:rPr lang="en-NZ" dirty="0" err="1"/>
               <a:t>LRITimer</a:t>
             </a:r>
-            <a:endParaRPr lang="en-NZ" dirty="0"/>
+            <a:r>
+              <a:rPr lang="en-NZ" dirty="0"/>
+              <a:t> (Lower Rate Interval)</a:t>
+            </a:r>
           </a:p>
         </p:txBody>
       </p:sp>
@@ -4431,7 +4836,10 @@
           <a:bodyPr/>
           <a:lstStyle/>
           <a:p>
-            <a:endParaRPr lang="en-NZ" dirty="0"/>
+            <a:r>
+              <a:rPr lang="en-NZ" dirty="0"/>
+              <a:t>Slowest rate the heart is allowed to operate. This is the time between the Ventricular Events</a:t>
+            </a:r>
           </a:p>
         </p:txBody>
       </p:sp>
@@ -4457,8 +4865,8 @@
         </p:blipFill>
         <p:spPr>
           <a:xfrm>
-            <a:off x="1524000" y="5223505"/>
-            <a:ext cx="2009775" cy="1190625"/>
+            <a:off x="1991544" y="3293768"/>
+            <a:ext cx="2771800" cy="1642062"/>
           </a:xfrm>
           <a:prstGeom prst="rect">
             <a:avLst/>
@@ -4467,13 +4875,7 @@
       </p:pic>
       <p:pic>
         <p:nvPicPr>
-          <p:cNvPr id="5" name="Picture 4">
-            <a:extLst>
-              <a:ext uri="{FF2B5EF4-FFF2-40B4-BE49-F238E27FC236}">
-                <a16:creationId xmlns:a16="http://schemas.microsoft.com/office/drawing/2014/main" id="{F2E9B709-2B38-464D-92E2-1960644AB4E5}"/>
-              </a:ext>
-            </a:extLst>
-          </p:cNvPr>
+          <p:cNvPr id="6" name="Picture 5"/>
           <p:cNvPicPr>
             <a:picLocks noChangeAspect="1"/>
           </p:cNvPicPr>
@@ -4487,8 +4889,8 @@
         </p:blipFill>
         <p:spPr>
           <a:xfrm>
-            <a:off x="3905250" y="3893925"/>
-            <a:ext cx="6762750" cy="2514600"/>
+            <a:off x="5807968" y="2780928"/>
+            <a:ext cx="5728038" cy="2871536"/>
           </a:xfrm>
           <a:prstGeom prst="rect">
             <a:avLst/>
@@ -4517,10 +4919,17 @@
       </p:transition>
     </mc:Fallback>
   </mc:AlternateContent>
+  <p:timing>
+    <p:tnLst>
+      <p:par>
+        <p:cTn id="1" dur="indefinite" restart="never" nodeType="tmRoot"/>
+      </p:par>
+    </p:tnLst>
+  </p:timing>
 </p:sld>
 </file>
 
-<file path=ppt/slides/slide5.xml><?xml version="1.0" encoding="utf-8"?>
+<file path=ppt/slides/slide7.xml><?xml version="1.0" encoding="utf-8"?>
 <p:sld xmlns:a="http://schemas.openxmlformats.org/drawingml/2006/main" xmlns:r="http://schemas.openxmlformats.org/officeDocument/2006/relationships" xmlns:p="http://schemas.openxmlformats.org/presentationml/2006/main">
   <p:cSld>
     <p:spTree>
@@ -4566,7 +4975,10 @@
               <a:rPr lang="en-NZ" dirty="0" err="1"/>
               <a:t>URITimer</a:t>
             </a:r>
-            <a:endParaRPr lang="en-NZ" dirty="0"/>
+            <a:r>
+              <a:rPr lang="en-NZ" dirty="0"/>
+              <a:t> (Upper Rate Interval)</a:t>
+            </a:r>
           </a:p>
         </p:txBody>
       </p:sp>
@@ -4591,7 +5003,13 @@
           <a:bodyPr/>
           <a:lstStyle/>
           <a:p>
-            <a:endParaRPr lang="en-NZ"/>
+            <a:r>
+              <a:rPr lang="en-NZ" dirty="0"/>
+              <a:t>Fast rate the heart is allowed to operate. This is the time between the Ventricular Events</a:t>
+            </a:r>
+          </a:p>
+          <a:p>
+            <a:endParaRPr lang="en-NZ" dirty="0"/>
           </a:p>
         </p:txBody>
       </p:sp>
@@ -4617,8 +5035,8 @@
         </p:blipFill>
         <p:spPr>
           <a:xfrm>
-            <a:off x="1631504" y="3509961"/>
-            <a:ext cx="2038350" cy="1209675"/>
+            <a:off x="2423592" y="3470661"/>
+            <a:ext cx="3235139" cy="1919919"/>
           </a:xfrm>
           <a:prstGeom prst="rect">
             <a:avLst/>
@@ -4627,13 +5045,7 @@
       </p:pic>
       <p:pic>
         <p:nvPicPr>
-          <p:cNvPr id="5" name="Picture 4">
-            <a:extLst>
-              <a:ext uri="{FF2B5EF4-FFF2-40B4-BE49-F238E27FC236}">
-                <a16:creationId xmlns:a16="http://schemas.microsoft.com/office/drawing/2014/main" id="{1A773D28-A225-44A0-ABFF-81047624A65D}"/>
-              </a:ext>
-            </a:extLst>
-          </p:cNvPr>
+          <p:cNvPr id="6" name="Picture 5"/>
           <p:cNvPicPr>
             <a:picLocks noChangeAspect="1"/>
           </p:cNvPicPr>
@@ -4647,8 +5059,8 @@
         </p:blipFill>
         <p:spPr>
           <a:xfrm>
-            <a:off x="4943872" y="2700335"/>
-            <a:ext cx="2514600" cy="2828925"/>
+            <a:off x="7464152" y="2276872"/>
+            <a:ext cx="2668687" cy="4363401"/>
           </a:xfrm>
           <a:prstGeom prst="rect">
             <a:avLst/>
@@ -4677,291 +5089,13 @@
       </p:transition>
     </mc:Fallback>
   </mc:AlternateContent>
-</p:sld>
-</file>
-
-<file path=ppt/slides/slide6.xml><?xml version="1.0" encoding="utf-8"?>
-<p:sld xmlns:a="http://schemas.openxmlformats.org/drawingml/2006/main" xmlns:r="http://schemas.openxmlformats.org/officeDocument/2006/relationships" xmlns:p="http://schemas.openxmlformats.org/presentationml/2006/main">
-  <p:cSld>
-    <p:spTree>
-      <p:nvGrpSpPr>
-        <p:cNvPr id="1" name=""/>
-        <p:cNvGrpSpPr/>
-        <p:nvPr/>
-      </p:nvGrpSpPr>
-      <p:grpSpPr>
-        <a:xfrm>
-          <a:off x="0" y="0"/>
-          <a:ext cx="0" cy="0"/>
-          <a:chOff x="0" y="0"/>
-          <a:chExt cx="0" cy="0"/>
-        </a:xfrm>
-      </p:grpSpPr>
-      <p:sp>
-        <p:nvSpPr>
-          <p:cNvPr id="2" name="Title 1">
-            <a:extLst>
-              <a:ext uri="{FF2B5EF4-FFF2-40B4-BE49-F238E27FC236}">
-                <a16:creationId xmlns:a16="http://schemas.microsoft.com/office/drawing/2014/main" id="{9C41E3E7-B5D2-4F20-B083-39774B938E67}"/>
-              </a:ext>
-            </a:extLst>
-          </p:cNvPr>
-          <p:cNvSpPr>
-            <a:spLocks noGrp="1"/>
-          </p:cNvSpPr>
-          <p:nvPr>
-            <p:ph type="title"/>
-          </p:nvPr>
-        </p:nvSpPr>
-        <p:spPr/>
-        <p:txBody>
-          <a:bodyPr/>
-          <a:lstStyle/>
-          <a:p>
-            <a:r>
-              <a:rPr lang="en-NZ" dirty="0"/>
-              <a:t>AEI and </a:t>
-            </a:r>
-            <a:r>
-              <a:rPr lang="en-NZ" dirty="0" err="1"/>
-              <a:t>AEITimer</a:t>
-            </a:r>
-            <a:endParaRPr lang="en-NZ" dirty="0"/>
-          </a:p>
-        </p:txBody>
-      </p:sp>
-      <p:sp>
-        <p:nvSpPr>
-          <p:cNvPr id="3" name="Content Placeholder 2">
-            <a:extLst>
-              <a:ext uri="{FF2B5EF4-FFF2-40B4-BE49-F238E27FC236}">
-                <a16:creationId xmlns:a16="http://schemas.microsoft.com/office/drawing/2014/main" id="{ACE32FF2-A151-4796-A878-B37096FEA82A}"/>
-              </a:ext>
-            </a:extLst>
-          </p:cNvPr>
-          <p:cNvSpPr>
-            <a:spLocks noGrp="1"/>
-          </p:cNvSpPr>
-          <p:nvPr>
-            <p:ph idx="1"/>
-          </p:nvPr>
-        </p:nvSpPr>
-        <p:spPr/>
-        <p:txBody>
-          <a:bodyPr/>
-          <a:lstStyle/>
-          <a:p>
-            <a:endParaRPr lang="en-NZ" dirty="0"/>
-          </a:p>
-        </p:txBody>
-      </p:sp>
-      <p:pic>
-        <p:nvPicPr>
-          <p:cNvPr id="5" name="Picture 4">
-            <a:extLst>
-              <a:ext uri="{FF2B5EF4-FFF2-40B4-BE49-F238E27FC236}">
-                <a16:creationId xmlns:a16="http://schemas.microsoft.com/office/drawing/2014/main" id="{2F260AFF-13E4-4826-8ACD-29157B6F22CE}"/>
-              </a:ext>
-            </a:extLst>
-          </p:cNvPr>
-          <p:cNvPicPr>
-            <a:picLocks noChangeAspect="1"/>
-          </p:cNvPicPr>
-          <p:nvPr/>
-        </p:nvPicPr>
-        <p:blipFill>
-          <a:blip r:embed="rId2"/>
-          <a:stretch>
-            <a:fillRect/>
-          </a:stretch>
-        </p:blipFill>
-        <p:spPr>
-          <a:xfrm>
-            <a:off x="1703512" y="3509961"/>
-            <a:ext cx="2343150" cy="1209675"/>
-          </a:xfrm>
-          <a:prstGeom prst="rect">
-            <a:avLst/>
-          </a:prstGeom>
-        </p:spPr>
-      </p:pic>
-      <p:pic>
-        <p:nvPicPr>
-          <p:cNvPr id="6" name="Picture 5">
-            <a:extLst>
-              <a:ext uri="{FF2B5EF4-FFF2-40B4-BE49-F238E27FC236}">
-                <a16:creationId xmlns:a16="http://schemas.microsoft.com/office/drawing/2014/main" id="{DDAA331C-ECF2-4D05-9F39-A92B22BF39A6}"/>
-              </a:ext>
-            </a:extLst>
-          </p:cNvPr>
-          <p:cNvPicPr>
-            <a:picLocks noChangeAspect="1"/>
-          </p:cNvPicPr>
-          <p:nvPr/>
-        </p:nvPicPr>
-        <p:blipFill>
-          <a:blip r:embed="rId3"/>
-          <a:stretch>
-            <a:fillRect/>
-          </a:stretch>
-        </p:blipFill>
-        <p:spPr>
-          <a:xfrm>
-            <a:off x="5591944" y="2643185"/>
-            <a:ext cx="3771900" cy="2943225"/>
-          </a:xfrm>
-          <a:prstGeom prst="rect">
-            <a:avLst/>
-          </a:prstGeom>
-        </p:spPr>
-      </p:pic>
-    </p:spTree>
-    <p:extLst>
-      <p:ext uri="{BB962C8B-B14F-4D97-AF65-F5344CB8AC3E}">
-        <p14:creationId xmlns:p14="http://schemas.microsoft.com/office/powerpoint/2010/main" val="3732500485"/>
-      </p:ext>
-    </p:extLst>
-  </p:cSld>
-  <p:clrMapOvr>
-    <a:masterClrMapping/>
-  </p:clrMapOvr>
-  <mc:AlternateContent xmlns:mc="http://schemas.openxmlformats.org/markup-compatibility/2006" xmlns:p14="http://schemas.microsoft.com/office/powerpoint/2010/main">
-    <mc:Choice Requires="p14">
-      <p:transition spd="med" p14:dur="700">
-        <p:fade/>
-      </p:transition>
-    </mc:Choice>
-    <mc:Fallback xmlns="">
-      <p:transition spd="med">
-        <p:fade/>
-      </p:transition>
-    </mc:Fallback>
-  </mc:AlternateContent>
-</p:sld>
-</file>
-
-<file path=ppt/slides/slide7.xml><?xml version="1.0" encoding="utf-8"?>
-<p:sld xmlns:a="http://schemas.openxmlformats.org/drawingml/2006/main" xmlns:r="http://schemas.openxmlformats.org/officeDocument/2006/relationships" xmlns:p="http://schemas.openxmlformats.org/presentationml/2006/main">
-  <p:cSld>
-    <p:spTree>
-      <p:nvGrpSpPr>
-        <p:cNvPr id="1" name=""/>
-        <p:cNvGrpSpPr/>
-        <p:nvPr/>
-      </p:nvGrpSpPr>
-      <p:grpSpPr>
-        <a:xfrm>
-          <a:off x="0" y="0"/>
-          <a:ext cx="0" cy="0"/>
-          <a:chOff x="0" y="0"/>
-          <a:chExt cx="0" cy="0"/>
-        </a:xfrm>
-      </p:grpSpPr>
-      <p:sp>
-        <p:nvSpPr>
-          <p:cNvPr id="2" name="Title 1">
-            <a:extLst>
-              <a:ext uri="{FF2B5EF4-FFF2-40B4-BE49-F238E27FC236}">
-                <a16:creationId xmlns:a16="http://schemas.microsoft.com/office/drawing/2014/main" id="{AF4F58B3-00C1-42BE-AA39-AF54C3AE9FB3}"/>
-              </a:ext>
-            </a:extLst>
-          </p:cNvPr>
-          <p:cNvSpPr>
-            <a:spLocks noGrp="1"/>
-          </p:cNvSpPr>
-          <p:nvPr>
-            <p:ph type="title"/>
-          </p:nvPr>
-        </p:nvSpPr>
-        <p:spPr/>
-        <p:txBody>
-          <a:bodyPr/>
-          <a:lstStyle/>
-          <a:p>
-            <a:r>
-              <a:rPr lang="en-NZ" dirty="0"/>
-              <a:t>VRP</a:t>
-            </a:r>
-          </a:p>
-        </p:txBody>
-      </p:sp>
-      <p:sp>
-        <p:nvSpPr>
-          <p:cNvPr id="3" name="Content Placeholder 2">
-            <a:extLst>
-              <a:ext uri="{FF2B5EF4-FFF2-40B4-BE49-F238E27FC236}">
-                <a16:creationId xmlns:a16="http://schemas.microsoft.com/office/drawing/2014/main" id="{8CEFB5CE-4A52-420B-A692-9217F4405754}"/>
-              </a:ext>
-            </a:extLst>
-          </p:cNvPr>
-          <p:cNvSpPr>
-            <a:spLocks noGrp="1"/>
-          </p:cNvSpPr>
-          <p:nvPr>
-            <p:ph idx="1"/>
-          </p:nvPr>
-        </p:nvSpPr>
-        <p:spPr/>
-        <p:txBody>
-          <a:bodyPr/>
-          <a:lstStyle/>
-          <a:p>
-            <a:endParaRPr lang="en-NZ"/>
-          </a:p>
-        </p:txBody>
-      </p:sp>
-      <p:pic>
-        <p:nvPicPr>
-          <p:cNvPr id="4" name="Picture 3">
-            <a:extLst>
-              <a:ext uri="{FF2B5EF4-FFF2-40B4-BE49-F238E27FC236}">
-                <a16:creationId xmlns:a16="http://schemas.microsoft.com/office/drawing/2014/main" id="{71005514-2F92-4547-941A-176121E3C9BA}"/>
-              </a:ext>
-            </a:extLst>
-          </p:cNvPr>
-          <p:cNvPicPr>
-            <a:picLocks noChangeAspect="1"/>
-          </p:cNvPicPr>
-          <p:nvPr/>
-        </p:nvPicPr>
-        <p:blipFill>
-          <a:blip r:embed="rId2"/>
-          <a:stretch>
-            <a:fillRect/>
-          </a:stretch>
-        </p:blipFill>
-        <p:spPr>
-          <a:xfrm>
-            <a:off x="4905375" y="3411528"/>
-            <a:ext cx="2381250" cy="1628775"/>
-          </a:xfrm>
-          <a:prstGeom prst="rect">
-            <a:avLst/>
-          </a:prstGeom>
-        </p:spPr>
-      </p:pic>
-    </p:spTree>
-    <p:extLst>
-      <p:ext uri="{BB962C8B-B14F-4D97-AF65-F5344CB8AC3E}">
-        <p14:creationId xmlns:p14="http://schemas.microsoft.com/office/powerpoint/2010/main" val="2722226679"/>
-      </p:ext>
-    </p:extLst>
-  </p:cSld>
-  <p:clrMapOvr>
-    <a:masterClrMapping/>
-  </p:clrMapOvr>
-  <mc:AlternateContent xmlns:mc="http://schemas.openxmlformats.org/markup-compatibility/2006" xmlns:p14="http://schemas.microsoft.com/office/powerpoint/2010/main">
-    <mc:Choice Requires="p14">
-      <p:transition spd="med" p14:dur="700">
-        <p:fade/>
-      </p:transition>
-    </mc:Choice>
-    <mc:Fallback xmlns="">
-      <p:transition spd="med">
-        <p:fade/>
-      </p:transition>
-    </mc:Fallback>
-  </mc:AlternateContent>
+  <p:timing>
+    <p:tnLst>
+      <p:par>
+        <p:cTn id="1" dur="indefinite" restart="never" nodeType="tmRoot"/>
+      </p:par>
+    </p:tnLst>
+  </p:timing>
 </p:sld>
 </file>
 
@@ -4987,7 +5121,7 @@
           <p:cNvPr id="2" name="Title 1">
             <a:extLst>
               <a:ext uri="{FF2B5EF4-FFF2-40B4-BE49-F238E27FC236}">
-                <a16:creationId xmlns:a16="http://schemas.microsoft.com/office/drawing/2014/main" id="{F36FB3B9-A40A-4385-A110-4F142D91ED71}"/>
+                <a16:creationId xmlns:a16="http://schemas.microsoft.com/office/drawing/2014/main" id="{C5C1D75E-1A47-482F-A255-CB8CAE00AE52}"/>
               </a:ext>
             </a:extLst>
           </p:cNvPr>
@@ -5005,7 +5139,7 @@
           <a:p>
             <a:r>
               <a:rPr lang="en-NZ" dirty="0"/>
-              <a:t>PVARP</a:t>
+              <a:t>Time</a:t>
             </a:r>
           </a:p>
         </p:txBody>
@@ -5015,7 +5149,7 @@
           <p:cNvPr id="3" name="Content Placeholder 2">
             <a:extLst>
               <a:ext uri="{FF2B5EF4-FFF2-40B4-BE49-F238E27FC236}">
-                <a16:creationId xmlns:a16="http://schemas.microsoft.com/office/drawing/2014/main" id="{623E30F5-38C8-45D9-BB12-BB953F9B9CFB}"/>
+                <a16:creationId xmlns:a16="http://schemas.microsoft.com/office/drawing/2014/main" id="{D6D95F68-9B70-4BF7-B23D-587663D4F6E1}"/>
               </a:ext>
             </a:extLst>
           </p:cNvPr>
@@ -5031,44 +5165,25 @@
           <a:bodyPr/>
           <a:lstStyle/>
           <a:p>
-            <a:endParaRPr lang="en-NZ"/>
-          </a:p>
-        </p:txBody>
-      </p:sp>
-      <p:pic>
-        <p:nvPicPr>
-          <p:cNvPr id="4" name="Picture 3">
-            <a:extLst>
-              <a:ext uri="{FF2B5EF4-FFF2-40B4-BE49-F238E27FC236}">
-                <a16:creationId xmlns:a16="http://schemas.microsoft.com/office/drawing/2014/main" id="{E3AFA16F-096B-43BB-BAF9-2600E980F4AC}"/>
-              </a:ext>
-            </a:extLst>
-          </p:cNvPr>
-          <p:cNvPicPr>
-            <a:picLocks noChangeAspect="1"/>
-          </p:cNvPicPr>
-          <p:nvPr/>
-        </p:nvPicPr>
-        <p:blipFill>
-          <a:blip r:embed="rId2"/>
-          <a:stretch>
-            <a:fillRect/>
-          </a:stretch>
-        </p:blipFill>
-        <p:spPr>
-          <a:xfrm>
-            <a:off x="4848225" y="3286124"/>
-            <a:ext cx="2495550" cy="1657350"/>
-          </a:xfrm>
-          <a:prstGeom prst="rect">
-            <a:avLst/>
-          </a:prstGeom>
-        </p:spPr>
-      </p:pic>
+            <a:r>
+              <a:rPr lang="en-NZ" dirty="0"/>
+              <a:t>Total time spent on this assignment: </a:t>
+            </a:r>
+            <a:r>
+              <a:rPr lang="en-NZ" dirty="0" smtClean="0"/>
+              <a:t>~16 hours (mainly </a:t>
+            </a:r>
+            <a:r>
+              <a:rPr lang="en-NZ" dirty="0"/>
+              <a:t>debugging)</a:t>
+            </a:r>
+          </a:p>
+        </p:txBody>
+      </p:sp>
     </p:spTree>
     <p:extLst>
       <p:ext uri="{BB962C8B-B14F-4D97-AF65-F5344CB8AC3E}">
-        <p14:creationId xmlns:p14="http://schemas.microsoft.com/office/powerpoint/2010/main" val="1636709026"/>
+        <p14:creationId xmlns:p14="http://schemas.microsoft.com/office/powerpoint/2010/main" val="482259675"/>
       </p:ext>
     </p:extLst>
   </p:cSld>
@@ -5087,166 +5202,13 @@
       </p:transition>
     </mc:Fallback>
   </mc:AlternateContent>
-</p:sld>
-</file>
-
-<file path=ppt/slides/slide9.xml><?xml version="1.0" encoding="utf-8"?>
-<p:sld xmlns:a="http://schemas.openxmlformats.org/drawingml/2006/main" xmlns:r="http://schemas.openxmlformats.org/officeDocument/2006/relationships" xmlns:p="http://schemas.openxmlformats.org/presentationml/2006/main">
-  <p:cSld>
-    <p:spTree>
-      <p:nvGrpSpPr>
-        <p:cNvPr id="1" name=""/>
-        <p:cNvGrpSpPr/>
-        <p:nvPr/>
-      </p:nvGrpSpPr>
-      <p:grpSpPr>
-        <a:xfrm>
-          <a:off x="0" y="0"/>
-          <a:ext cx="0" cy="0"/>
-          <a:chOff x="0" y="0"/>
-          <a:chExt cx="0" cy="0"/>
-        </a:xfrm>
-      </p:grpSpPr>
-      <p:sp>
-        <p:nvSpPr>
-          <p:cNvPr id="2" name="Title 1">
-            <a:extLst>
-              <a:ext uri="{FF2B5EF4-FFF2-40B4-BE49-F238E27FC236}">
-                <a16:creationId xmlns:a16="http://schemas.microsoft.com/office/drawing/2014/main" id="{ACA4E274-B443-40FC-B519-4F087C987E15}"/>
-              </a:ext>
-            </a:extLst>
-          </p:cNvPr>
-          <p:cNvSpPr>
-            <a:spLocks noGrp="1"/>
-          </p:cNvSpPr>
-          <p:nvPr>
-            <p:ph type="title"/>
-          </p:nvPr>
-        </p:nvSpPr>
-        <p:spPr/>
-        <p:txBody>
-          <a:bodyPr/>
-          <a:lstStyle/>
-          <a:p>
-            <a:r>
-              <a:rPr lang="en-NZ" dirty="0"/>
-              <a:t>AVI and </a:t>
-            </a:r>
-            <a:r>
-              <a:rPr lang="en-NZ" dirty="0" err="1"/>
-              <a:t>AVITimer</a:t>
-            </a:r>
-            <a:endParaRPr lang="en-NZ" dirty="0"/>
-          </a:p>
-        </p:txBody>
-      </p:sp>
-      <p:sp>
-        <p:nvSpPr>
-          <p:cNvPr id="3" name="Content Placeholder 2">
-            <a:extLst>
-              <a:ext uri="{FF2B5EF4-FFF2-40B4-BE49-F238E27FC236}">
-                <a16:creationId xmlns:a16="http://schemas.microsoft.com/office/drawing/2014/main" id="{43BB4A1C-D7F5-4AD6-93E7-8ED4FE1B4288}"/>
-              </a:ext>
-            </a:extLst>
-          </p:cNvPr>
-          <p:cNvSpPr>
-            <a:spLocks noGrp="1"/>
-          </p:cNvSpPr>
-          <p:nvPr>
-            <p:ph idx="1"/>
-          </p:nvPr>
-        </p:nvSpPr>
-        <p:spPr/>
-        <p:txBody>
-          <a:bodyPr/>
-          <a:lstStyle/>
-          <a:p>
-            <a:endParaRPr lang="en-NZ" dirty="0"/>
-          </a:p>
-        </p:txBody>
-      </p:sp>
-      <p:pic>
-        <p:nvPicPr>
-          <p:cNvPr id="4" name="Picture 3">
-            <a:extLst>
-              <a:ext uri="{FF2B5EF4-FFF2-40B4-BE49-F238E27FC236}">
-                <a16:creationId xmlns:a16="http://schemas.microsoft.com/office/drawing/2014/main" id="{7C30C730-98F9-4B7E-AA11-7FD3348AFC29}"/>
-              </a:ext>
-            </a:extLst>
-          </p:cNvPr>
-          <p:cNvPicPr>
-            <a:picLocks noChangeAspect="1"/>
-          </p:cNvPicPr>
-          <p:nvPr/>
-        </p:nvPicPr>
-        <p:blipFill>
-          <a:blip r:embed="rId2"/>
-          <a:stretch>
-            <a:fillRect/>
-          </a:stretch>
-        </p:blipFill>
-        <p:spPr>
-          <a:xfrm>
-            <a:off x="1524000" y="3140968"/>
-            <a:ext cx="5172075" cy="2095500"/>
-          </a:xfrm>
-          <a:prstGeom prst="rect">
-            <a:avLst/>
-          </a:prstGeom>
-        </p:spPr>
-      </p:pic>
-      <p:pic>
-        <p:nvPicPr>
-          <p:cNvPr id="6" name="Picture 5">
-            <a:extLst>
-              <a:ext uri="{FF2B5EF4-FFF2-40B4-BE49-F238E27FC236}">
-                <a16:creationId xmlns:a16="http://schemas.microsoft.com/office/drawing/2014/main" id="{C906BB4E-BA60-4586-9288-119C23BCF5A2}"/>
-              </a:ext>
-            </a:extLst>
-          </p:cNvPr>
-          <p:cNvPicPr>
-            <a:picLocks noChangeAspect="1"/>
-          </p:cNvPicPr>
-          <p:nvPr/>
-        </p:nvPicPr>
-        <p:blipFill>
-          <a:blip r:embed="rId3"/>
-          <a:stretch>
-            <a:fillRect/>
-          </a:stretch>
-        </p:blipFill>
-        <p:spPr>
-          <a:xfrm>
-            <a:off x="7067550" y="2595561"/>
-            <a:ext cx="4057650" cy="3038475"/>
-          </a:xfrm>
-          <a:prstGeom prst="rect">
-            <a:avLst/>
-          </a:prstGeom>
-        </p:spPr>
-      </p:pic>
-    </p:spTree>
-    <p:extLst>
-      <p:ext uri="{BB962C8B-B14F-4D97-AF65-F5344CB8AC3E}">
-        <p14:creationId xmlns:p14="http://schemas.microsoft.com/office/powerpoint/2010/main" val="3904751218"/>
-      </p:ext>
-    </p:extLst>
-  </p:cSld>
-  <p:clrMapOvr>
-    <a:masterClrMapping/>
-  </p:clrMapOvr>
-  <mc:AlternateContent xmlns:mc="http://schemas.openxmlformats.org/markup-compatibility/2006" xmlns:p14="http://schemas.microsoft.com/office/powerpoint/2010/main">
-    <mc:Choice Requires="p14">
-      <p:transition spd="med" p14:dur="700">
-        <p:fade/>
-      </p:transition>
-    </mc:Choice>
-    <mc:Fallback xmlns="">
-      <p:transition spd="med">
-        <p:fade/>
-      </p:transition>
-    </mc:Fallback>
-  </mc:AlternateContent>
+  <p:timing>
+    <p:tnLst>
+      <p:par>
+        <p:cTn id="1" dur="indefinite" restart="never" nodeType="tmRoot"/>
+      </p:par>
+    </p:tnLst>
+  </p:timing>
 </p:sld>
 </file>
 

</xml_diff>